<commit_message>
Update Cavebound presentation - fyp.pptx
</commit_message>
<xml_diff>
--- a/Documents/Cavebound presentation - fyp.pptx
+++ b/Documents/Cavebound presentation - fyp.pptx
@@ -11,11 +11,13 @@
     <p:sldId id="258" r:id="rId8"/>
     <p:sldId id="259" r:id="rId9"/>
     <p:sldId id="263" r:id="rId10"/>
-    <p:sldId id="264" r:id="rId11"/>
-    <p:sldId id="265" r:id="rId12"/>
-    <p:sldId id="262" r:id="rId13"/>
-    <p:sldId id="266" r:id="rId14"/>
-    <p:sldId id="260" r:id="rId15"/>
+    <p:sldId id="267" r:id="rId11"/>
+    <p:sldId id="264" r:id="rId12"/>
+    <p:sldId id="265" r:id="rId13"/>
+    <p:sldId id="268" r:id="rId14"/>
+    <p:sldId id="262" r:id="rId15"/>
+    <p:sldId id="266" r:id="rId16"/>
+    <p:sldId id="260" r:id="rId17"/>
   </p:sldIdLst>
   <p:sldSz cx="12192000" cy="6858000"/>
   <p:notesSz cx="6858000" cy="9144000"/>
@@ -114,6 +116,11 @@
       </a:defRPr>
     </a:lvl9pPr>
   </p:defaultTextStyle>
+  <p:extLst>
+    <p:ext uri="{EFAFB233-063F-42B5-8137-9DF3F51BA10A}">
+      <p15:sldGuideLst xmlns:p15="http://schemas.microsoft.com/office/powerpoint/2012/main"/>
+    </p:ext>
+  </p:extLst>
 </p:presentation>
 </file>
 
@@ -586,7 +593,7 @@
           <a:p>
             <a:fld id="{EA0C0817-A112-4847-8014-A94B7D2A4EA3}" type="datetime1">
               <a:rPr lang="en-US" smtClean="0"/>
-              <a:t>12/14/2022</a:t>
+              <a:t>12/15/2022</a:t>
             </a:fld>
             <a:endParaRPr lang="en-US" dirty="0"/>
           </a:p>
@@ -788,7 +795,7 @@
           <a:p>
             <a:fld id="{134F40B7-36AB-4376-BE14-EF7004D79BB9}" type="datetime1">
               <a:rPr lang="en-US" smtClean="0"/>
-              <a:t>12/14/2022</a:t>
+              <a:t>12/15/2022</a:t>
             </a:fld>
             <a:endParaRPr lang="en-US"/>
           </a:p>
@@ -968,7 +975,7 @@
           <a:p>
             <a:fld id="{FF87CAB8-DCAE-46A5-AADA-B3FAD11A54E0}" type="datetime1">
               <a:rPr lang="en-US" smtClean="0"/>
-              <a:t>12/14/2022</a:t>
+              <a:t>12/15/2022</a:t>
             </a:fld>
             <a:endParaRPr lang="en-US"/>
           </a:p>
@@ -1138,7 +1145,7 @@
           <a:p>
             <a:fld id="{7332B432-ACDA-4023-A761-2BAB76577B62}" type="datetime1">
               <a:rPr lang="en-US" smtClean="0"/>
-              <a:t>12/14/2022</a:t>
+              <a:t>12/15/2022</a:t>
             </a:fld>
             <a:endParaRPr lang="en-US"/>
           </a:p>
@@ -1737,7 +1744,7 @@
           <a:p>
             <a:fld id="{D9C646AA-F36E-4540-911D-FFFC0A0EF24A}" type="datetime1">
               <a:rPr lang="en-US" smtClean="0"/>
-              <a:t>12/14/2022</a:t>
+              <a:t>12/15/2022</a:t>
             </a:fld>
             <a:endParaRPr lang="en-US" dirty="0"/>
           </a:p>
@@ -2057,7 +2064,7 @@
           <a:p>
             <a:fld id="{69186D26-FA5F-4637-B602-B7C2DC34CFD4}" type="datetime1">
               <a:rPr lang="en-US" smtClean="0"/>
-              <a:t>12/14/2022</a:t>
+              <a:t>12/15/2022</a:t>
             </a:fld>
             <a:endParaRPr lang="en-US"/>
           </a:p>
@@ -2492,7 +2499,7 @@
           <a:p>
             <a:fld id="{8A7F15D8-96D1-4781-BC50-CA8A088B2FE4}" type="datetime1">
               <a:rPr lang="en-US" smtClean="0"/>
-              <a:t>12/14/2022</a:t>
+              <a:t>12/15/2022</a:t>
             </a:fld>
             <a:endParaRPr lang="en-US"/>
           </a:p>
@@ -2610,7 +2617,7 @@
           <a:p>
             <a:fld id="{F9A96C99-B8F8-4528-BD05-0E16E943DC09}" type="datetime1">
               <a:rPr lang="en-US" smtClean="0"/>
-              <a:t>12/14/2022</a:t>
+              <a:t>12/15/2022</a:t>
             </a:fld>
             <a:endParaRPr lang="en-US"/>
           </a:p>
@@ -2705,7 +2712,7 @@
           <a:p>
             <a:fld id="{03636942-C211-4B28-8DBD-C953E00AF71B}" type="datetime1">
               <a:rPr lang="en-US" smtClean="0"/>
-              <a:t>12/14/2022</a:t>
+              <a:t>12/15/2022</a:t>
             </a:fld>
             <a:endParaRPr lang="en-US"/>
           </a:p>
@@ -3122,7 +3129,7 @@
           <a:p>
             <a:fld id="{7E8D12A6-918A-48BD-8CB9-CA713993B0EA}" type="datetime1">
               <a:rPr lang="en-US" smtClean="0"/>
-              <a:t>12/14/2022</a:t>
+              <a:t>12/15/2022</a:t>
             </a:fld>
             <a:endParaRPr lang="en-US"/>
           </a:p>
@@ -3384,7 +3391,7 @@
             <a:fld id="{E778CE86-875F-4587-BCF6-FA054AFC0D53}" type="datetime1">
               <a:rPr lang="en-US" smtClean="0"/>
               <a:pPr/>
-              <a:t>12/14/2022</a:t>
+              <a:t>12/15/2022</a:t>
             </a:fld>
             <a:endParaRPr lang="en-US" dirty="0"/>
           </a:p>
@@ -3900,7 +3907,7 @@
           <a:p>
             <a:fld id="{F6FA2B21-3FCD-4721-B95C-427943F61125}" type="datetime1">
               <a:rPr lang="en-US" smtClean="0"/>
-              <a:t>12/14/2022</a:t>
+              <a:t>12/15/2022</a:t>
             </a:fld>
             <a:endParaRPr lang="en-US"/>
           </a:p>
@@ -4828,6 +4835,259 @@
           <p:cNvPr id="2" name="Title 1">
             <a:extLst>
               <a:ext uri="{FF2B5EF4-FFF2-40B4-BE49-F238E27FC236}">
+                <a16:creationId xmlns:a16="http://schemas.microsoft.com/office/drawing/2014/main" id="{15EAAF31-529F-9C98-3038-F4DC8BCF8F57}"/>
+              </a:ext>
+            </a:extLst>
+          </p:cNvPr>
+          <p:cNvSpPr>
+            <a:spLocks noGrp="1"/>
+          </p:cNvSpPr>
+          <p:nvPr>
+            <p:ph type="title"/>
+          </p:nvPr>
+        </p:nvSpPr>
+        <p:spPr/>
+        <p:txBody>
+          <a:bodyPr/>
+          <a:lstStyle/>
+          <a:p>
+            <a:r>
+              <a:rPr lang="en-GB" dirty="0"/>
+              <a:t>Images of current Implementations:</a:t>
+            </a:r>
+          </a:p>
+        </p:txBody>
+      </p:sp>
+      <p:pic>
+        <p:nvPicPr>
+          <p:cNvPr id="7" name="Picture 6">
+            <a:extLst>
+              <a:ext uri="{FF2B5EF4-FFF2-40B4-BE49-F238E27FC236}">
+                <a16:creationId xmlns:a16="http://schemas.microsoft.com/office/drawing/2014/main" id="{AFB1F0B3-489C-8C04-211F-52437FF676A4}"/>
+              </a:ext>
+            </a:extLst>
+          </p:cNvPr>
+          <p:cNvPicPr>
+            <a:picLocks noChangeAspect="1"/>
+          </p:cNvPicPr>
+          <p:nvPr/>
+        </p:nvPicPr>
+        <p:blipFill rotWithShape="1">
+          <a:blip r:embed="rId2"/>
+          <a:srcRect b="68250"/>
+          <a:stretch/>
+        </p:blipFill>
+        <p:spPr>
+          <a:xfrm>
+            <a:off x="962143" y="1568671"/>
+            <a:ext cx="9031449" cy="2227474"/>
+          </a:xfrm>
+          <a:prstGeom prst="rect">
+            <a:avLst/>
+          </a:prstGeom>
+        </p:spPr>
+      </p:pic>
+      <p:pic>
+        <p:nvPicPr>
+          <p:cNvPr id="9" name="Picture 8">
+            <a:extLst>
+              <a:ext uri="{FF2B5EF4-FFF2-40B4-BE49-F238E27FC236}">
+                <a16:creationId xmlns:a16="http://schemas.microsoft.com/office/drawing/2014/main" id="{2C896798-3C83-CB20-11B5-92921C75A2FB}"/>
+              </a:ext>
+            </a:extLst>
+          </p:cNvPr>
+          <p:cNvPicPr>
+            <a:picLocks noChangeAspect="1"/>
+          </p:cNvPicPr>
+          <p:nvPr/>
+        </p:nvPicPr>
+        <p:blipFill rotWithShape="1">
+          <a:blip r:embed="rId2"/>
+          <a:srcRect t="63185"/>
+          <a:stretch/>
+        </p:blipFill>
+        <p:spPr>
+          <a:xfrm>
+            <a:off x="962143" y="3925453"/>
+            <a:ext cx="9010903" cy="2576947"/>
+          </a:xfrm>
+          <a:prstGeom prst="rect">
+            <a:avLst/>
+          </a:prstGeom>
+        </p:spPr>
+      </p:pic>
+    </p:spTree>
+    <p:extLst>
+      <p:ext uri="{BB962C8B-B14F-4D97-AF65-F5344CB8AC3E}">
+        <p14:creationId xmlns:p14="http://schemas.microsoft.com/office/powerpoint/2010/main" val="1904751216"/>
+      </p:ext>
+    </p:extLst>
+  </p:cSld>
+  <p:clrMapOvr>
+    <a:masterClrMapping/>
+  </p:clrMapOvr>
+</p:sld>
+</file>
+
+<file path=ppt/slides/slide11.xml><?xml version="1.0" encoding="utf-8"?>
+<p:sld xmlns:a="http://schemas.openxmlformats.org/drawingml/2006/main" xmlns:r="http://schemas.openxmlformats.org/officeDocument/2006/relationships" xmlns:p="http://schemas.openxmlformats.org/presentationml/2006/main">
+  <p:cSld>
+    <p:spTree>
+      <p:nvGrpSpPr>
+        <p:cNvPr id="1" name=""/>
+        <p:cNvGrpSpPr/>
+        <p:nvPr/>
+      </p:nvGrpSpPr>
+      <p:grpSpPr>
+        <a:xfrm>
+          <a:off x="0" y="0"/>
+          <a:ext cx="0" cy="0"/>
+          <a:chOff x="0" y="0"/>
+          <a:chExt cx="0" cy="0"/>
+        </a:xfrm>
+      </p:grpSpPr>
+      <p:sp>
+        <p:nvSpPr>
+          <p:cNvPr id="2" name="Title 1">
+            <a:extLst>
+              <a:ext uri="{FF2B5EF4-FFF2-40B4-BE49-F238E27FC236}">
+                <a16:creationId xmlns:a16="http://schemas.microsoft.com/office/drawing/2014/main" id="{3F4C9543-379C-6E07-79FA-867A6833B6F0}"/>
+              </a:ext>
+            </a:extLst>
+          </p:cNvPr>
+          <p:cNvSpPr>
+            <a:spLocks noGrp="1"/>
+          </p:cNvSpPr>
+          <p:nvPr>
+            <p:ph type="title"/>
+          </p:nvPr>
+        </p:nvSpPr>
+        <p:spPr/>
+        <p:txBody>
+          <a:bodyPr/>
+          <a:lstStyle/>
+          <a:p>
+            <a:r>
+              <a:rPr lang="en-GB" dirty="0"/>
+              <a:t>Images of current Implementations:</a:t>
+            </a:r>
+          </a:p>
+        </p:txBody>
+      </p:sp>
+      <p:pic>
+        <p:nvPicPr>
+          <p:cNvPr id="5" name="Content Placeholder 4">
+            <a:extLst>
+              <a:ext uri="{FF2B5EF4-FFF2-40B4-BE49-F238E27FC236}">
+                <a16:creationId xmlns:a16="http://schemas.microsoft.com/office/drawing/2014/main" id="{4DC46AEF-BD18-E582-24E3-EF07A36DB6C6}"/>
+              </a:ext>
+            </a:extLst>
+          </p:cNvPr>
+          <p:cNvPicPr>
+            <a:picLocks noGrp="1" noChangeAspect="1"/>
+          </p:cNvPicPr>
+          <p:nvPr>
+            <p:ph idx="1"/>
+          </p:nvPr>
+        </p:nvPicPr>
+        <p:blipFill>
+          <a:blip r:embed="rId2"/>
+          <a:stretch>
+            <a:fillRect/>
+          </a:stretch>
+        </p:blipFill>
+        <p:spPr>
+          <a:xfrm>
+            <a:off x="466725" y="3295650"/>
+            <a:ext cx="11247998" cy="3116825"/>
+          </a:xfrm>
+        </p:spPr>
+      </p:pic>
+      <p:sp>
+        <p:nvSpPr>
+          <p:cNvPr id="6" name="TextBox 5">
+            <a:extLst>
+              <a:ext uri="{FF2B5EF4-FFF2-40B4-BE49-F238E27FC236}">
+                <a16:creationId xmlns:a16="http://schemas.microsoft.com/office/drawing/2014/main" id="{4D0CC4D4-BE98-83C9-F0AC-83BDA979E916}"/>
+              </a:ext>
+            </a:extLst>
+          </p:cNvPr>
+          <p:cNvSpPr txBox="1"/>
+          <p:nvPr/>
+        </p:nvSpPr>
+        <p:spPr>
+          <a:xfrm>
+            <a:off x="657225" y="1747494"/>
+            <a:ext cx="10877550" cy="1354217"/>
+          </a:xfrm>
+          <a:prstGeom prst="rect">
+            <a:avLst/>
+          </a:prstGeom>
+          <a:noFill/>
+        </p:spPr>
+        <p:txBody>
+          <a:bodyPr wrap="square" rtlCol="0">
+            <a:spAutoFit/>
+          </a:bodyPr>
+          <a:lstStyle/>
+          <a:p>
+            <a:r>
+              <a:rPr lang="en-GB" sz="2800" dirty="0"/>
+              <a:t>Proof of concept lobby system</a:t>
+            </a:r>
+          </a:p>
+          <a:p>
+            <a:endParaRPr lang="en-GB" dirty="0"/>
+          </a:p>
+          <a:p>
+            <a:r>
+              <a:rPr lang="en-GB" dirty="0"/>
+              <a:t>Shows two clients, one acts as a host , the other a client of that host</a:t>
+            </a:r>
+          </a:p>
+          <a:p>
+            <a:r>
+              <a:rPr lang="en-GB" dirty="0"/>
+              <a:t>The host can remove the second client if they wish.</a:t>
+            </a:r>
+          </a:p>
+        </p:txBody>
+      </p:sp>
+    </p:spTree>
+    <p:extLst>
+      <p:ext uri="{BB962C8B-B14F-4D97-AF65-F5344CB8AC3E}">
+        <p14:creationId xmlns:p14="http://schemas.microsoft.com/office/powerpoint/2010/main" val="3450767015"/>
+      </p:ext>
+    </p:extLst>
+  </p:cSld>
+  <p:clrMapOvr>
+    <a:masterClrMapping/>
+  </p:clrMapOvr>
+</p:sld>
+</file>
+
+<file path=ppt/slides/slide12.xml><?xml version="1.0" encoding="utf-8"?>
+<p:sld xmlns:a="http://schemas.openxmlformats.org/drawingml/2006/main" xmlns:r="http://schemas.openxmlformats.org/officeDocument/2006/relationships" xmlns:p="http://schemas.openxmlformats.org/presentationml/2006/main">
+  <p:cSld>
+    <p:spTree>
+      <p:nvGrpSpPr>
+        <p:cNvPr id="1" name=""/>
+        <p:cNvGrpSpPr/>
+        <p:nvPr/>
+      </p:nvGrpSpPr>
+      <p:grpSpPr>
+        <a:xfrm>
+          <a:off x="0" y="0"/>
+          <a:ext cx="0" cy="0"/>
+          <a:chOff x="0" y="0"/>
+          <a:chExt cx="0" cy="0"/>
+        </a:xfrm>
+      </p:grpSpPr>
+      <p:sp>
+        <p:nvSpPr>
+          <p:cNvPr id="2" name="Title 1">
+            <a:extLst>
+              <a:ext uri="{FF2B5EF4-FFF2-40B4-BE49-F238E27FC236}">
                 <a16:creationId xmlns:a16="http://schemas.microsoft.com/office/drawing/2014/main" id="{3F4C9543-379C-6E07-79FA-867A6833B6F0}"/>
               </a:ext>
             </a:extLst>
@@ -4943,7 +5203,7 @@
 </p:sld>
 </file>
 
-<file path=ppt/slides/slide11.xml><?xml version="1.0" encoding="utf-8"?>
+<file path=ppt/slides/slide13.xml><?xml version="1.0" encoding="utf-8"?>
 <p:sld xmlns:a="http://schemas.openxmlformats.org/drawingml/2006/main" xmlns:r="http://schemas.openxmlformats.org/officeDocument/2006/relationships" xmlns:p="http://schemas.openxmlformats.org/presentationml/2006/main">
   <p:cSld>
     <p:spTree>
@@ -5465,7 +5725,9 @@
         </p:nvSpPr>
         <p:spPr/>
         <p:txBody>
-          <a:bodyPr/>
+          <a:bodyPr>
+            <a:normAutofit fontScale="92500" lnSpcReduction="10000"/>
+          </a:bodyPr>
           <a:lstStyle/>
           <a:p>
             <a:r>
@@ -5510,7 +5772,7 @@
             <a:pPr lvl="1"/>
             <a:r>
               <a:rPr lang="en-GB" dirty="0"/>
-              <a:t>I am using technology's (2D tile-sets, Perlin noise, etc.) to help promote myself to use existing technology's in creative and different ways e.g. simple and effective 2D underground level generation.</a:t>
+              <a:t>I am using existing technologies (2D tile sets, Perlin noise, etc.) to help promote myself to think of creative/useful game mechanics and systems e.g. simple and effective 2D underground-level generation and fortune wheel rewards.</a:t>
             </a:r>
           </a:p>
           <a:p>
@@ -5521,7 +5783,18 @@
             <a:pPr lvl="1"/>
             <a:r>
               <a:rPr lang="en-GB" dirty="0"/>
-              <a:t>To encourage myself to not be afraid to experiment with new technology's like blockchain and rendering pipelines.</a:t>
+              <a:t>To encourage me not to be afraid to experiment with new types of technology like blockchain and rendering pipelines (URP).</a:t>
+            </a:r>
+          </a:p>
+          <a:p>
+            <a:pPr lvl="1"/>
+            <a:endParaRPr lang="en-GB" dirty="0"/>
+          </a:p>
+          <a:p>
+            <a:pPr lvl="1"/>
+            <a:r>
+              <a:rPr lang="en-GB" dirty="0"/>
+              <a:t>To have a great deliverable to show off to potential employers.</a:t>
             </a:r>
           </a:p>
           <a:p>
@@ -5850,6 +6123,92 @@
           <p:cNvPr id="2" name="Title 1">
             <a:extLst>
               <a:ext uri="{FF2B5EF4-FFF2-40B4-BE49-F238E27FC236}">
+                <a16:creationId xmlns:a16="http://schemas.microsoft.com/office/drawing/2014/main" id="{3602A485-6D5A-EC6F-489C-2F711A5AC5E3}"/>
+              </a:ext>
+            </a:extLst>
+          </p:cNvPr>
+          <p:cNvSpPr>
+            <a:spLocks noGrp="1"/>
+          </p:cNvSpPr>
+          <p:nvPr>
+            <p:ph type="title"/>
+          </p:nvPr>
+        </p:nvSpPr>
+        <p:spPr/>
+        <p:txBody>
+          <a:bodyPr/>
+          <a:lstStyle/>
+          <a:p>
+            <a:r>
+              <a:rPr lang="en-IE" dirty="0"/>
+              <a:t>Map generation code</a:t>
+            </a:r>
+          </a:p>
+        </p:txBody>
+      </p:sp>
+      <p:pic>
+        <p:nvPicPr>
+          <p:cNvPr id="5" name="Content Placeholder 4">
+            <a:extLst>
+              <a:ext uri="{FF2B5EF4-FFF2-40B4-BE49-F238E27FC236}">
+                <a16:creationId xmlns:a16="http://schemas.microsoft.com/office/drawing/2014/main" id="{0661ADF9-7D1F-E1D7-8CA7-AC0D312C924B}"/>
+              </a:ext>
+            </a:extLst>
+          </p:cNvPr>
+          <p:cNvPicPr>
+            <a:picLocks noGrp="1" noChangeAspect="1"/>
+          </p:cNvPicPr>
+          <p:nvPr>
+            <p:ph idx="1"/>
+          </p:nvPr>
+        </p:nvPicPr>
+        <p:blipFill rotWithShape="1">
+          <a:blip r:embed="rId2"/>
+          <a:srcRect r="13933" b="38851"/>
+          <a:stretch/>
+        </p:blipFill>
+        <p:spPr>
+          <a:xfrm>
+            <a:off x="558799" y="1747336"/>
+            <a:ext cx="7633855" cy="4623728"/>
+          </a:xfrm>
+        </p:spPr>
+      </p:pic>
+    </p:spTree>
+    <p:extLst>
+      <p:ext uri="{BB962C8B-B14F-4D97-AF65-F5344CB8AC3E}">
+        <p14:creationId xmlns:p14="http://schemas.microsoft.com/office/powerpoint/2010/main" val="666500400"/>
+      </p:ext>
+    </p:extLst>
+  </p:cSld>
+  <p:clrMapOvr>
+    <a:masterClrMapping/>
+  </p:clrMapOvr>
+</p:sld>
+</file>
+
+<file path=ppt/slides/slide8.xml><?xml version="1.0" encoding="utf-8"?>
+<p:sld xmlns:a="http://schemas.openxmlformats.org/drawingml/2006/main" xmlns:r="http://schemas.openxmlformats.org/officeDocument/2006/relationships" xmlns:p="http://schemas.openxmlformats.org/presentationml/2006/main">
+  <p:cSld>
+    <p:spTree>
+      <p:nvGrpSpPr>
+        <p:cNvPr id="1" name=""/>
+        <p:cNvGrpSpPr/>
+        <p:nvPr/>
+      </p:nvGrpSpPr>
+      <p:grpSpPr>
+        <a:xfrm>
+          <a:off x="0" y="0"/>
+          <a:ext cx="0" cy="0"/>
+          <a:chOff x="0" y="0"/>
+          <a:chExt cx="0" cy="0"/>
+        </a:xfrm>
+      </p:grpSpPr>
+      <p:sp>
+        <p:nvSpPr>
+          <p:cNvPr id="2" name="Title 1">
+            <a:extLst>
+              <a:ext uri="{FF2B5EF4-FFF2-40B4-BE49-F238E27FC236}">
                 <a16:creationId xmlns:a16="http://schemas.microsoft.com/office/drawing/2014/main" id="{3F4C9543-379C-6E07-79FA-867A6833B6F0}"/>
               </a:ext>
             </a:extLst>
@@ -5888,7 +6247,7 @@
         <p:spPr>
           <a:xfrm>
             <a:off x="1066800" y="1827597"/>
-            <a:ext cx="4829176" cy="2185214"/>
+            <a:ext cx="4829176" cy="3016210"/>
           </a:xfrm>
           <a:prstGeom prst="rect">
             <a:avLst/>
@@ -5912,7 +6271,16 @@
           <a:p>
             <a:r>
               <a:rPr lang="en-GB" dirty="0"/>
-              <a:t>This will be each players safe space, where they can spawn and have a safe shield (not implemented yet) that will keep them safe while they are in it to combat spawn trapping</a:t>
+              <a:t>This will be each player’s safe space, where they can spawn and have a safe shield (not implemented yet) that will keep them safe while they are in it to combat spawn trapping.</a:t>
+            </a:r>
+          </a:p>
+          <a:p>
+            <a:endParaRPr lang="en-GB" dirty="0"/>
+          </a:p>
+          <a:p>
+            <a:r>
+              <a:rPr lang="en-GB" dirty="0"/>
+              <a:t>This spawn box will be made of different tiles and be changed in size</a:t>
             </a:r>
           </a:p>
           <a:p>
@@ -5963,7 +6331,7 @@
 </p:sld>
 </file>
 
-<file path=ppt/slides/slide8.xml><?xml version="1.0" encoding="utf-8"?>
+<file path=ppt/slides/slide9.xml><?xml version="1.0" encoding="utf-8"?>
 <p:sld xmlns:a="http://schemas.openxmlformats.org/drawingml/2006/main" xmlns:r="http://schemas.openxmlformats.org/officeDocument/2006/relationships" xmlns:p="http://schemas.openxmlformats.org/presentationml/2006/main">
   <p:cSld>
     <p:spTree>
@@ -6245,143 +6613,6 @@
       </p:par>
     </p:tnLst>
   </p:timing>
-</p:sld>
-</file>
-
-<file path=ppt/slides/slide9.xml><?xml version="1.0" encoding="utf-8"?>
-<p:sld xmlns:a="http://schemas.openxmlformats.org/drawingml/2006/main" xmlns:r="http://schemas.openxmlformats.org/officeDocument/2006/relationships" xmlns:p="http://schemas.openxmlformats.org/presentationml/2006/main">
-  <p:cSld>
-    <p:spTree>
-      <p:nvGrpSpPr>
-        <p:cNvPr id="1" name=""/>
-        <p:cNvGrpSpPr/>
-        <p:nvPr/>
-      </p:nvGrpSpPr>
-      <p:grpSpPr>
-        <a:xfrm>
-          <a:off x="0" y="0"/>
-          <a:ext cx="0" cy="0"/>
-          <a:chOff x="0" y="0"/>
-          <a:chExt cx="0" cy="0"/>
-        </a:xfrm>
-      </p:grpSpPr>
-      <p:sp>
-        <p:nvSpPr>
-          <p:cNvPr id="2" name="Title 1">
-            <a:extLst>
-              <a:ext uri="{FF2B5EF4-FFF2-40B4-BE49-F238E27FC236}">
-                <a16:creationId xmlns:a16="http://schemas.microsoft.com/office/drawing/2014/main" id="{3F4C9543-379C-6E07-79FA-867A6833B6F0}"/>
-              </a:ext>
-            </a:extLst>
-          </p:cNvPr>
-          <p:cNvSpPr>
-            <a:spLocks noGrp="1"/>
-          </p:cNvSpPr>
-          <p:nvPr>
-            <p:ph type="title"/>
-          </p:nvPr>
-        </p:nvSpPr>
-        <p:spPr/>
-        <p:txBody>
-          <a:bodyPr/>
-          <a:lstStyle/>
-          <a:p>
-            <a:r>
-              <a:rPr lang="en-GB" dirty="0"/>
-              <a:t>Images of current Implementations:</a:t>
-            </a:r>
-          </a:p>
-        </p:txBody>
-      </p:sp>
-      <p:pic>
-        <p:nvPicPr>
-          <p:cNvPr id="5" name="Content Placeholder 4">
-            <a:extLst>
-              <a:ext uri="{FF2B5EF4-FFF2-40B4-BE49-F238E27FC236}">
-                <a16:creationId xmlns:a16="http://schemas.microsoft.com/office/drawing/2014/main" id="{4DC46AEF-BD18-E582-24E3-EF07A36DB6C6}"/>
-              </a:ext>
-            </a:extLst>
-          </p:cNvPr>
-          <p:cNvPicPr>
-            <a:picLocks noGrp="1" noChangeAspect="1"/>
-          </p:cNvPicPr>
-          <p:nvPr>
-            <p:ph idx="1"/>
-          </p:nvPr>
-        </p:nvPicPr>
-        <p:blipFill>
-          <a:blip r:embed="rId2"/>
-          <a:stretch>
-            <a:fillRect/>
-          </a:stretch>
-        </p:blipFill>
-        <p:spPr>
-          <a:xfrm>
-            <a:off x="466725" y="3295650"/>
-            <a:ext cx="11247998" cy="3116825"/>
-          </a:xfrm>
-        </p:spPr>
-      </p:pic>
-      <p:sp>
-        <p:nvSpPr>
-          <p:cNvPr id="6" name="TextBox 5">
-            <a:extLst>
-              <a:ext uri="{FF2B5EF4-FFF2-40B4-BE49-F238E27FC236}">
-                <a16:creationId xmlns:a16="http://schemas.microsoft.com/office/drawing/2014/main" id="{4D0CC4D4-BE98-83C9-F0AC-83BDA979E916}"/>
-              </a:ext>
-            </a:extLst>
-          </p:cNvPr>
-          <p:cNvSpPr txBox="1"/>
-          <p:nvPr/>
-        </p:nvSpPr>
-        <p:spPr>
-          <a:xfrm>
-            <a:off x="657225" y="1747494"/>
-            <a:ext cx="10877550" cy="1354217"/>
-          </a:xfrm>
-          <a:prstGeom prst="rect">
-            <a:avLst/>
-          </a:prstGeom>
-          <a:noFill/>
-        </p:spPr>
-        <p:txBody>
-          <a:bodyPr wrap="square" rtlCol="0">
-            <a:spAutoFit/>
-          </a:bodyPr>
-          <a:lstStyle/>
-          <a:p>
-            <a:r>
-              <a:rPr lang="en-GB" sz="2800" dirty="0"/>
-              <a:t>Proof of concept lobby system</a:t>
-            </a:r>
-          </a:p>
-          <a:p>
-            <a:endParaRPr lang="en-GB" dirty="0"/>
-          </a:p>
-          <a:p>
-            <a:r>
-              <a:rPr lang="en-GB" dirty="0"/>
-              <a:t>Shows two clients, one acts as a host , the other a client of that host</a:t>
-            </a:r>
-          </a:p>
-          <a:p>
-            <a:r>
-              <a:rPr lang="en-GB" dirty="0"/>
-              <a:t>The host can remove the second client if they wish.</a:t>
-            </a:r>
-          </a:p>
-        </p:txBody>
-      </p:sp>
-    </p:spTree>
-    <p:extLst>
-      <p:ext uri="{BB962C8B-B14F-4D97-AF65-F5344CB8AC3E}">
-        <p14:creationId xmlns:p14="http://schemas.microsoft.com/office/powerpoint/2010/main" val="3450767015"/>
-      </p:ext>
-    </p:extLst>
-  </p:cSld>
-  <p:clrMapOvr>
-    <a:masterClrMapping/>
-  </p:clrMapOvr>
 </p:sld>
 </file>
 
@@ -6662,6 +6893,15 @@
 </file>
 
 <file path=customXml/item1.xml><?xml version="1.0" encoding="utf-8"?>
+<?mso-contentType ?>
+<FormTemplates xmlns="http://schemas.microsoft.com/sharepoint/v3/contenttype/forms">
+  <Display>DocumentLibraryForm</Display>
+  <Edit>DocumentLibraryForm</Edit>
+  <New>DocumentLibraryForm</New>
+</FormTemplates>
+</file>
+
+<file path=customXml/item2.xml><?xml version="1.0" encoding="utf-8"?>
 <ct:contentTypeSchema xmlns:ct="http://schemas.microsoft.com/office/2006/metadata/contentType" xmlns:ma="http://schemas.microsoft.com/office/2006/metadata/properties/metaAttributes" ct:_="" ma:_="" ma:contentTypeName="Document" ma:contentTypeID="0x010100D3ECDC982DFD724389DC1DE5B80204FC" ma:contentTypeVersion="13" ma:contentTypeDescription="Create a new document." ma:contentTypeScope="" ma:versionID="dbe7db257eb240d45885095e514e2cff">
   <xsd:schema xmlns:xsd="http://www.w3.org/2001/XMLSchema" xmlns:xs="http://www.w3.org/2001/XMLSchema" xmlns:p="http://schemas.microsoft.com/office/2006/metadata/properties" xmlns:ns3="48556a24-f96b-41bd-9234-4c8fb1ec45f4" xmlns:ns4="dd4c0e5d-2996-4a4c-b761-d52b1a88ab3a" targetNamespace="http://schemas.microsoft.com/office/2006/metadata/properties" ma:root="true" ma:fieldsID="89c0150fa174bd290c46c36095821f02" ns3:_="" ns4:_="">
     <xsd:import namespace="48556a24-f96b-41bd-9234-4c8fb1ec45f4"/>
@@ -6884,15 +7124,6 @@
 </ct:contentTypeSchema>
 </file>
 
-<file path=customXml/item2.xml><?xml version="1.0" encoding="utf-8"?>
-<?mso-contentType ?>
-<FormTemplates xmlns="http://schemas.microsoft.com/sharepoint/v3/contenttype/forms">
-  <Display>DocumentLibraryForm</Display>
-  <Edit>DocumentLibraryForm</Edit>
-  <New>DocumentLibraryForm</New>
-</FormTemplates>
-</file>
-
 <file path=customXml/item3.xml><?xml version="1.0" encoding="utf-8"?>
 <p:properties xmlns:p="http://schemas.microsoft.com/office/2006/metadata/properties" xmlns:xsi="http://www.w3.org/2001/XMLSchema-instance" xmlns:pc="http://schemas.microsoft.com/office/infopath/2007/PartnerControls">
   <documentManagement/>
@@ -6900,6 +7131,14 @@
 </file>
 
 <file path=customXml/itemProps1.xml><?xml version="1.0" encoding="utf-8"?>
+<ds:datastoreItem xmlns:ds="http://schemas.openxmlformats.org/officeDocument/2006/customXml" ds:itemID="{350ED7D6-6069-4FA0-8FC1-1B8E00515EF5}">
+  <ds:schemaRefs>
+    <ds:schemaRef ds:uri="http://schemas.microsoft.com/sharepoint/v3/contenttype/forms"/>
+  </ds:schemaRefs>
+</ds:datastoreItem>
+</file>
+
+<file path=customXml/itemProps2.xml><?xml version="1.0" encoding="utf-8"?>
 <ds:datastoreItem xmlns:ds="http://schemas.openxmlformats.org/officeDocument/2006/customXml" ds:itemID="{FBC9E6F7-E1D3-46AD-A9B0-30E7E11B411C}">
   <ds:schemaRefs>
     <ds:schemaRef ds:uri="http://schemas.microsoft.com/office/2006/metadata/contentType"/>
@@ -6914,14 +7153,6 @@
     <ds:schemaRef ds:uri="http://purl.org/dc/elements/1.1/"/>
     <ds:schemaRef ds:uri="http://purl.org/dc/terms/"/>
     <ds:schemaRef ds:uri="http://schemas.microsoft.com/internal/obd"/>
-  </ds:schemaRefs>
-</ds:datastoreItem>
-</file>
-
-<file path=customXml/itemProps2.xml><?xml version="1.0" encoding="utf-8"?>
-<ds:datastoreItem xmlns:ds="http://schemas.openxmlformats.org/officeDocument/2006/customXml" ds:itemID="{350ED7D6-6069-4FA0-8FC1-1B8E00515EF5}">
-  <ds:schemaRefs>
-    <ds:schemaRef ds:uri="http://schemas.microsoft.com/sharepoint/v3/contenttype/forms"/>
   </ds:schemaRefs>
 </ds:datastoreItem>
 </file>

</xml_diff>